<commit_message>
Added building blocks on first slide :)
</commit_message>
<xml_diff>
--- a/Analog elektronik/examPrep/BJT/Diagrams_BJT.pptx
+++ b/Analog elektronik/examPrep/BJT/Diagrams_BJT.pptx
@@ -5,12 +5,13 @@
     <p:sldMasterId id="2147483648" r:id="rId1"/>
   </p:sldMasterIdLst>
   <p:sldIdLst>
-    <p:sldId id="256" r:id="rId2"/>
-    <p:sldId id="257" r:id="rId3"/>
-    <p:sldId id="259" r:id="rId4"/>
-    <p:sldId id="260" r:id="rId5"/>
-    <p:sldId id="261" r:id="rId6"/>
-    <p:sldId id="262" r:id="rId7"/>
+    <p:sldId id="263" r:id="rId2"/>
+    <p:sldId id="256" r:id="rId3"/>
+    <p:sldId id="257" r:id="rId4"/>
+    <p:sldId id="259" r:id="rId5"/>
+    <p:sldId id="260" r:id="rId6"/>
+    <p:sldId id="261" r:id="rId7"/>
+    <p:sldId id="262" r:id="rId8"/>
   </p:sldIdLst>
   <p:sldSz cx="12192000" cy="6858000"/>
   <p:notesSz cx="6858000" cy="9144000"/>
@@ -264,7 +265,7 @@
           <a:p>
             <a:fld id="{07F1134A-591F-4889-A8F7-180982371E0F}" type="datetimeFigureOut">
               <a:rPr lang="da-DK" smtClean="0"/>
-              <a:t>05-06-2024</a:t>
+              <a:t>06-06-2024</a:t>
             </a:fld>
             <a:endParaRPr lang="da-DK"/>
           </a:p>
@@ -462,7 +463,7 @@
           <a:p>
             <a:fld id="{07F1134A-591F-4889-A8F7-180982371E0F}" type="datetimeFigureOut">
               <a:rPr lang="da-DK" smtClean="0"/>
-              <a:t>05-06-2024</a:t>
+              <a:t>06-06-2024</a:t>
             </a:fld>
             <a:endParaRPr lang="da-DK"/>
           </a:p>
@@ -670,7 +671,7 @@
           <a:p>
             <a:fld id="{07F1134A-591F-4889-A8F7-180982371E0F}" type="datetimeFigureOut">
               <a:rPr lang="da-DK" smtClean="0"/>
-              <a:t>05-06-2024</a:t>
+              <a:t>06-06-2024</a:t>
             </a:fld>
             <a:endParaRPr lang="da-DK"/>
           </a:p>
@@ -868,7 +869,7 @@
           <a:p>
             <a:fld id="{07F1134A-591F-4889-A8F7-180982371E0F}" type="datetimeFigureOut">
               <a:rPr lang="da-DK" smtClean="0"/>
-              <a:t>05-06-2024</a:t>
+              <a:t>06-06-2024</a:t>
             </a:fld>
             <a:endParaRPr lang="da-DK"/>
           </a:p>
@@ -1143,7 +1144,7 @@
           <a:p>
             <a:fld id="{07F1134A-591F-4889-A8F7-180982371E0F}" type="datetimeFigureOut">
               <a:rPr lang="da-DK" smtClean="0"/>
-              <a:t>05-06-2024</a:t>
+              <a:t>06-06-2024</a:t>
             </a:fld>
             <a:endParaRPr lang="da-DK"/>
           </a:p>
@@ -1408,7 +1409,7 @@
           <a:p>
             <a:fld id="{07F1134A-591F-4889-A8F7-180982371E0F}" type="datetimeFigureOut">
               <a:rPr lang="da-DK" smtClean="0"/>
-              <a:t>05-06-2024</a:t>
+              <a:t>06-06-2024</a:t>
             </a:fld>
             <a:endParaRPr lang="da-DK"/>
           </a:p>
@@ -1820,7 +1821,7 @@
           <a:p>
             <a:fld id="{07F1134A-591F-4889-A8F7-180982371E0F}" type="datetimeFigureOut">
               <a:rPr lang="da-DK" smtClean="0"/>
-              <a:t>05-06-2024</a:t>
+              <a:t>06-06-2024</a:t>
             </a:fld>
             <a:endParaRPr lang="da-DK"/>
           </a:p>
@@ -1961,7 +1962,7 @@
           <a:p>
             <a:fld id="{07F1134A-591F-4889-A8F7-180982371E0F}" type="datetimeFigureOut">
               <a:rPr lang="da-DK" smtClean="0"/>
-              <a:t>05-06-2024</a:t>
+              <a:t>06-06-2024</a:t>
             </a:fld>
             <a:endParaRPr lang="da-DK"/>
           </a:p>
@@ -2074,7 +2075,7 @@
           <a:p>
             <a:fld id="{07F1134A-591F-4889-A8F7-180982371E0F}" type="datetimeFigureOut">
               <a:rPr lang="da-DK" smtClean="0"/>
-              <a:t>05-06-2024</a:t>
+              <a:t>06-06-2024</a:t>
             </a:fld>
             <a:endParaRPr lang="da-DK"/>
           </a:p>
@@ -2385,7 +2386,7 @@
           <a:p>
             <a:fld id="{07F1134A-591F-4889-A8F7-180982371E0F}" type="datetimeFigureOut">
               <a:rPr lang="da-DK" smtClean="0"/>
-              <a:t>05-06-2024</a:t>
+              <a:t>06-06-2024</a:t>
             </a:fld>
             <a:endParaRPr lang="da-DK"/>
           </a:p>
@@ -2673,7 +2674,7 @@
           <a:p>
             <a:fld id="{07F1134A-591F-4889-A8F7-180982371E0F}" type="datetimeFigureOut">
               <a:rPr lang="da-DK" smtClean="0"/>
-              <a:t>05-06-2024</a:t>
+              <a:t>06-06-2024</a:t>
             </a:fld>
             <a:endParaRPr lang="da-DK"/>
           </a:p>
@@ -2914,7 +2915,7 @@
           <a:p>
             <a:fld id="{07F1134A-591F-4889-A8F7-180982371E0F}" type="datetimeFigureOut">
               <a:rPr lang="da-DK" smtClean="0"/>
-              <a:t>05-06-2024</a:t>
+              <a:t>06-06-2024</a:t>
             </a:fld>
             <a:endParaRPr lang="da-DK"/>
           </a:p>
@@ -3345,6 +3346,1312 @@
         </p:nvGrpSpPr>
         <p:grpSpPr>
           <a:xfrm>
+            <a:off x="4397929" y="1379970"/>
+            <a:ext cx="1118908" cy="478837"/>
+            <a:chOff x="1321878" y="1305575"/>
+            <a:chExt cx="1118908" cy="478837"/>
+          </a:xfrm>
+        </p:grpSpPr>
+        <p:grpSp>
+          <p:nvGrpSpPr>
+            <p:cNvPr id="25" name="Gruppe 24">
+              <a:extLst>
+                <a:ext uri="{FF2B5EF4-FFF2-40B4-BE49-F238E27FC236}">
+                  <a16:creationId xmlns:a16="http://schemas.microsoft.com/office/drawing/2014/main" id="{12E0DCD1-BACB-0746-595D-7307D8DA363B}"/>
+                </a:ext>
+              </a:extLst>
+            </p:cNvPr>
+            <p:cNvGrpSpPr/>
+            <p:nvPr/>
+          </p:nvGrpSpPr>
+          <p:grpSpPr>
+            <a:xfrm>
+              <a:off x="1321878" y="1606858"/>
+              <a:ext cx="1057338" cy="177554"/>
+              <a:chOff x="1321878" y="1606858"/>
+              <a:chExt cx="1057338" cy="177554"/>
+            </a:xfrm>
+          </p:grpSpPr>
+          <p:sp>
+            <p:nvSpPr>
+              <p:cNvPr id="4" name="Rektangel 3">
+                <a:extLst>
+                  <a:ext uri="{FF2B5EF4-FFF2-40B4-BE49-F238E27FC236}">
+                    <a16:creationId xmlns:a16="http://schemas.microsoft.com/office/drawing/2014/main" id="{A0EE0DA4-E7DA-4342-1127-C5F79E780DF4}"/>
+                  </a:ext>
+                </a:extLst>
+              </p:cNvPr>
+              <p:cNvSpPr/>
+              <p:nvPr/>
+            </p:nvSpPr>
+            <p:spPr>
+              <a:xfrm>
+                <a:off x="1518082" y="1606858"/>
+                <a:ext cx="665825" cy="177554"/>
+              </a:xfrm>
+              <a:prstGeom prst="rect">
+                <a:avLst/>
+              </a:prstGeom>
+              <a:noFill/>
+              <a:ln w="12700">
+                <a:solidFill>
+                  <a:schemeClr val="tx1"/>
+                </a:solidFill>
+              </a:ln>
+            </p:spPr>
+            <p:style>
+              <a:lnRef idx="2">
+                <a:schemeClr val="accent1">
+                  <a:shade val="15000"/>
+                </a:schemeClr>
+              </a:lnRef>
+              <a:fillRef idx="1">
+                <a:schemeClr val="accent1"/>
+              </a:fillRef>
+              <a:effectRef idx="0">
+                <a:schemeClr val="accent1"/>
+              </a:effectRef>
+              <a:fontRef idx="minor">
+                <a:schemeClr val="lt1"/>
+              </a:fontRef>
+            </p:style>
+            <p:txBody>
+              <a:bodyPr rtlCol="0" anchor="ctr"/>
+              <a:lstStyle/>
+              <a:p>
+                <a:pPr algn="ctr"/>
+                <a:endParaRPr lang="da-DK"/>
+              </a:p>
+            </p:txBody>
+          </p:sp>
+          <p:cxnSp>
+            <p:nvCxnSpPr>
+              <p:cNvPr id="6" name="Lige forbindelse 5">
+                <a:extLst>
+                  <a:ext uri="{FF2B5EF4-FFF2-40B4-BE49-F238E27FC236}">
+                    <a16:creationId xmlns:a16="http://schemas.microsoft.com/office/drawing/2014/main" id="{5241D086-0B51-BE6D-903D-6222A63E76D9}"/>
+                  </a:ext>
+                </a:extLst>
+              </p:cNvPr>
+              <p:cNvCxnSpPr>
+                <a:cxnSpLocks/>
+                <a:stCxn id="4" idx="3"/>
+              </p:cNvCxnSpPr>
+              <p:nvPr/>
+            </p:nvCxnSpPr>
+            <p:spPr>
+              <a:xfrm>
+                <a:off x="2183907" y="1695635"/>
+                <a:ext cx="195309" cy="0"/>
+              </a:xfrm>
+              <a:prstGeom prst="line">
+                <a:avLst/>
+              </a:prstGeom>
+              <a:ln w="12700">
+                <a:solidFill>
+                  <a:schemeClr val="tx1"/>
+                </a:solidFill>
+              </a:ln>
+            </p:spPr>
+            <p:style>
+              <a:lnRef idx="2">
+                <a:schemeClr val="accent1"/>
+              </a:lnRef>
+              <a:fillRef idx="0">
+                <a:schemeClr val="accent1"/>
+              </a:fillRef>
+              <a:effectRef idx="1">
+                <a:schemeClr val="accent1"/>
+              </a:effectRef>
+              <a:fontRef idx="minor">
+                <a:schemeClr val="tx1"/>
+              </a:fontRef>
+            </p:style>
+          </p:cxnSp>
+          <p:cxnSp>
+            <p:nvCxnSpPr>
+              <p:cNvPr id="9" name="Lige forbindelse 8">
+                <a:extLst>
+                  <a:ext uri="{FF2B5EF4-FFF2-40B4-BE49-F238E27FC236}">
+                    <a16:creationId xmlns:a16="http://schemas.microsoft.com/office/drawing/2014/main" id="{2FBC4CFA-6906-2D8A-67A6-9B23669C1985}"/>
+                  </a:ext>
+                </a:extLst>
+              </p:cNvPr>
+              <p:cNvCxnSpPr>
+                <a:cxnSpLocks/>
+              </p:cNvCxnSpPr>
+              <p:nvPr/>
+            </p:nvCxnSpPr>
+            <p:spPr>
+              <a:xfrm>
+                <a:off x="1321878" y="1702728"/>
+                <a:ext cx="195309" cy="0"/>
+              </a:xfrm>
+              <a:prstGeom prst="line">
+                <a:avLst/>
+              </a:prstGeom>
+              <a:ln w="12700">
+                <a:solidFill>
+                  <a:schemeClr val="tx1"/>
+                </a:solidFill>
+              </a:ln>
+            </p:spPr>
+            <p:style>
+              <a:lnRef idx="2">
+                <a:schemeClr val="accent1"/>
+              </a:lnRef>
+              <a:fillRef idx="0">
+                <a:schemeClr val="accent1"/>
+              </a:fillRef>
+              <a:effectRef idx="1">
+                <a:schemeClr val="accent1"/>
+              </a:effectRef>
+              <a:fontRef idx="minor">
+                <a:schemeClr val="tx1"/>
+              </a:fontRef>
+            </p:style>
+          </p:cxnSp>
+        </p:grpSp>
+        <p:sp>
+          <p:nvSpPr>
+            <p:cNvPr id="10" name="Tekstfelt 9">
+              <a:extLst>
+                <a:ext uri="{FF2B5EF4-FFF2-40B4-BE49-F238E27FC236}">
+                  <a16:creationId xmlns:a16="http://schemas.microsoft.com/office/drawing/2014/main" id="{CEB50BFA-9F62-FCF1-9A84-06FFB6FE2EFA}"/>
+                </a:ext>
+              </a:extLst>
+            </p:cNvPr>
+            <p:cNvSpPr txBox="1"/>
+            <p:nvPr/>
+          </p:nvSpPr>
+          <p:spPr>
+            <a:xfrm>
+              <a:off x="1419532" y="1305575"/>
+              <a:ext cx="1021254" cy="276999"/>
+            </a:xfrm>
+            <a:prstGeom prst="rect">
+              <a:avLst/>
+            </a:prstGeom>
+            <a:noFill/>
+          </p:spPr>
+          <p:txBody>
+            <a:bodyPr wrap="square" rtlCol="0">
+              <a:spAutoFit/>
+            </a:bodyPr>
+            <a:lstStyle/>
+            <a:p>
+              <a:r>
+                <a:rPr lang="da-DK" sz="1200" dirty="0"/>
+                <a:t>R1 = 200</a:t>
+              </a:r>
+              <a:r>
+                <a:rPr lang="el-GR" sz="1200" dirty="0"/>
+                <a:t>Ω</a:t>
+              </a:r>
+              <a:endParaRPr lang="da-DK" sz="1200" dirty="0"/>
+            </a:p>
+          </p:txBody>
+        </p:sp>
+      </p:grpSp>
+      <p:cxnSp>
+        <p:nvCxnSpPr>
+          <p:cNvPr id="11" name="Lige forbindelse 10">
+            <a:extLst>
+              <a:ext uri="{FF2B5EF4-FFF2-40B4-BE49-F238E27FC236}">
+                <a16:creationId xmlns:a16="http://schemas.microsoft.com/office/drawing/2014/main" id="{09C3341B-21EF-59A9-EC1C-D34C2D86E994}"/>
+              </a:ext>
+            </a:extLst>
+          </p:cNvPr>
+          <p:cNvCxnSpPr>
+            <a:cxnSpLocks/>
+          </p:cNvCxnSpPr>
+          <p:nvPr/>
+        </p:nvCxnSpPr>
+        <p:spPr>
+          <a:xfrm>
+            <a:off x="1321878" y="1702728"/>
+            <a:ext cx="0" cy="553775"/>
+          </a:xfrm>
+          <a:prstGeom prst="line">
+            <a:avLst/>
+          </a:prstGeom>
+          <a:ln w="12700">
+            <a:solidFill>
+              <a:schemeClr val="tx1"/>
+            </a:solidFill>
+          </a:ln>
+        </p:spPr>
+        <p:style>
+          <a:lnRef idx="2">
+            <a:schemeClr val="accent1"/>
+          </a:lnRef>
+          <a:fillRef idx="0">
+            <a:schemeClr val="accent1"/>
+          </a:fillRef>
+          <a:effectRef idx="1">
+            <a:schemeClr val="accent1"/>
+          </a:effectRef>
+          <a:fontRef idx="minor">
+            <a:schemeClr val="tx1"/>
+          </a:fontRef>
+        </p:style>
+      </p:cxnSp>
+      <p:grpSp>
+        <p:nvGrpSpPr>
+          <p:cNvPr id="59" name="Gruppe 58">
+            <a:extLst>
+              <a:ext uri="{FF2B5EF4-FFF2-40B4-BE49-F238E27FC236}">
+                <a16:creationId xmlns:a16="http://schemas.microsoft.com/office/drawing/2014/main" id="{B8969811-69D7-4407-D433-2D0E367E2F47}"/>
+              </a:ext>
+            </a:extLst>
+          </p:cNvPr>
+          <p:cNvGrpSpPr/>
+          <p:nvPr/>
+        </p:nvGrpSpPr>
+        <p:grpSpPr>
+          <a:xfrm>
+            <a:off x="758719" y="2151680"/>
+            <a:ext cx="776989" cy="646331"/>
+            <a:chOff x="758719" y="2151680"/>
+            <a:chExt cx="776989" cy="646331"/>
+          </a:xfrm>
+        </p:grpSpPr>
+        <p:grpSp>
+          <p:nvGrpSpPr>
+            <p:cNvPr id="24" name="Gruppe 23">
+              <a:extLst>
+                <a:ext uri="{FF2B5EF4-FFF2-40B4-BE49-F238E27FC236}">
+                  <a16:creationId xmlns:a16="http://schemas.microsoft.com/office/drawing/2014/main" id="{88155691-E979-EAAF-18D9-3E242901A3D9}"/>
+                </a:ext>
+              </a:extLst>
+            </p:cNvPr>
+            <p:cNvGrpSpPr/>
+            <p:nvPr/>
+          </p:nvGrpSpPr>
+          <p:grpSpPr>
+            <a:xfrm>
+              <a:off x="1108047" y="2151680"/>
+              <a:ext cx="427661" cy="646331"/>
+              <a:chOff x="1108047" y="2151680"/>
+              <a:chExt cx="427661" cy="646331"/>
+            </a:xfrm>
+          </p:grpSpPr>
+          <p:sp>
+            <p:nvSpPr>
+              <p:cNvPr id="14" name="Rutediagram: Forbindelse 13">
+                <a:extLst>
+                  <a:ext uri="{FF2B5EF4-FFF2-40B4-BE49-F238E27FC236}">
+                    <a16:creationId xmlns:a16="http://schemas.microsoft.com/office/drawing/2014/main" id="{472AA276-6E30-B6FC-6C46-60D929792716}"/>
+                  </a:ext>
+                </a:extLst>
+              </p:cNvPr>
+              <p:cNvSpPr/>
+              <p:nvPr/>
+            </p:nvSpPr>
+            <p:spPr>
+              <a:xfrm>
+                <a:off x="1108047" y="2256503"/>
+                <a:ext cx="427661" cy="428273"/>
+              </a:xfrm>
+              <a:prstGeom prst="flowChartConnector">
+                <a:avLst/>
+              </a:prstGeom>
+              <a:noFill/>
+              <a:ln w="12700">
+                <a:solidFill>
+                  <a:schemeClr val="tx1"/>
+                </a:solidFill>
+              </a:ln>
+            </p:spPr>
+            <p:style>
+              <a:lnRef idx="2">
+                <a:schemeClr val="accent1">
+                  <a:shade val="15000"/>
+                </a:schemeClr>
+              </a:lnRef>
+              <a:fillRef idx="1">
+                <a:schemeClr val="accent1"/>
+              </a:fillRef>
+              <a:effectRef idx="0">
+                <a:schemeClr val="accent1"/>
+              </a:effectRef>
+              <a:fontRef idx="minor">
+                <a:schemeClr val="lt1"/>
+              </a:fontRef>
+            </p:style>
+            <p:txBody>
+              <a:bodyPr rtlCol="0" anchor="ctr"/>
+              <a:lstStyle/>
+              <a:p>
+                <a:pPr algn="ctr"/>
+                <a:endParaRPr lang="da-DK"/>
+              </a:p>
+            </p:txBody>
+          </p:sp>
+          <p:sp>
+            <p:nvSpPr>
+              <p:cNvPr id="15" name="Tekstfelt 14">
+                <a:extLst>
+                  <a:ext uri="{FF2B5EF4-FFF2-40B4-BE49-F238E27FC236}">
+                    <a16:creationId xmlns:a16="http://schemas.microsoft.com/office/drawing/2014/main" id="{0C949CF8-58AE-8896-FA2C-E288FFA2D229}"/>
+                  </a:ext>
+                </a:extLst>
+              </p:cNvPr>
+              <p:cNvSpPr txBox="1"/>
+              <p:nvPr/>
+            </p:nvSpPr>
+            <p:spPr>
+              <a:xfrm>
+                <a:off x="1178939" y="2151680"/>
+                <a:ext cx="285875" cy="646331"/>
+              </a:xfrm>
+              <a:prstGeom prst="rect">
+                <a:avLst/>
+              </a:prstGeom>
+              <a:noFill/>
+            </p:spPr>
+            <p:txBody>
+              <a:bodyPr wrap="square" rtlCol="0">
+                <a:spAutoFit/>
+              </a:bodyPr>
+              <a:lstStyle/>
+              <a:p>
+                <a:pPr algn="ctr"/>
+                <a:r>
+                  <a:rPr lang="da-DK" dirty="0"/>
+                  <a:t>+</a:t>
+                </a:r>
+                <a:br>
+                  <a:rPr lang="da-DK" dirty="0"/>
+                </a:br>
+                <a:r>
+                  <a:rPr lang="da-DK" dirty="0"/>
+                  <a:t>-</a:t>
+                </a:r>
+              </a:p>
+            </p:txBody>
+          </p:sp>
+        </p:grpSp>
+        <p:sp>
+          <p:nvSpPr>
+            <p:cNvPr id="16" name="Tekstfelt 15">
+              <a:extLst>
+                <a:ext uri="{FF2B5EF4-FFF2-40B4-BE49-F238E27FC236}">
+                  <a16:creationId xmlns:a16="http://schemas.microsoft.com/office/drawing/2014/main" id="{C565C779-4BE6-D643-07AF-2A7B0644273C}"/>
+                </a:ext>
+              </a:extLst>
+            </p:cNvPr>
+            <p:cNvSpPr txBox="1"/>
+            <p:nvPr/>
+          </p:nvSpPr>
+          <p:spPr>
+            <a:xfrm>
+              <a:off x="758719" y="2252352"/>
+              <a:ext cx="449824" cy="461665"/>
+            </a:xfrm>
+            <a:prstGeom prst="rect">
+              <a:avLst/>
+            </a:prstGeom>
+            <a:noFill/>
+          </p:spPr>
+          <p:txBody>
+            <a:bodyPr wrap="square" rtlCol="0">
+              <a:spAutoFit/>
+            </a:bodyPr>
+            <a:lstStyle/>
+            <a:p>
+              <a:r>
+                <a:rPr lang="da-DK" sz="1200" dirty="0"/>
+                <a:t>Vo</a:t>
+              </a:r>
+              <a:br>
+                <a:rPr lang="da-DK" sz="1200" dirty="0"/>
+              </a:br>
+              <a:r>
+                <a:rPr lang="da-DK" sz="1200" dirty="0"/>
+                <a:t>5V</a:t>
+              </a:r>
+            </a:p>
+          </p:txBody>
+        </p:sp>
+      </p:grpSp>
+      <p:grpSp>
+        <p:nvGrpSpPr>
+          <p:cNvPr id="23" name="Gruppe 22">
+            <a:extLst>
+              <a:ext uri="{FF2B5EF4-FFF2-40B4-BE49-F238E27FC236}">
+                <a16:creationId xmlns:a16="http://schemas.microsoft.com/office/drawing/2014/main" id="{F17EF282-5010-5820-F142-564D49D0FFB4}"/>
+              </a:ext>
+            </a:extLst>
+          </p:cNvPr>
+          <p:cNvGrpSpPr/>
+          <p:nvPr/>
+        </p:nvGrpSpPr>
+        <p:grpSpPr>
+          <a:xfrm>
+            <a:off x="2244215" y="2021979"/>
+            <a:ext cx="270001" cy="683772"/>
+            <a:chOff x="2768163" y="1692021"/>
+            <a:chExt cx="270001" cy="683772"/>
+          </a:xfrm>
+        </p:grpSpPr>
+        <p:sp>
+          <p:nvSpPr>
+            <p:cNvPr id="17" name="Ligebenet trekant 16">
+              <a:extLst>
+                <a:ext uri="{FF2B5EF4-FFF2-40B4-BE49-F238E27FC236}">
+                  <a16:creationId xmlns:a16="http://schemas.microsoft.com/office/drawing/2014/main" id="{1E4B8B14-ED73-6D20-026E-6D68073CEAA8}"/>
+                </a:ext>
+              </a:extLst>
+            </p:cNvPr>
+            <p:cNvSpPr/>
+            <p:nvPr/>
+          </p:nvSpPr>
+          <p:spPr>
+            <a:xfrm rot="10800000">
+              <a:off x="2768164" y="1880419"/>
+              <a:ext cx="270000" cy="271261"/>
+            </a:xfrm>
+            <a:prstGeom prst="triangle">
+              <a:avLst/>
+            </a:prstGeom>
+            <a:noFill/>
+            <a:ln w="12700">
+              <a:solidFill>
+                <a:schemeClr val="tx1"/>
+              </a:solidFill>
+            </a:ln>
+          </p:spPr>
+          <p:style>
+            <a:lnRef idx="2">
+              <a:schemeClr val="accent1">
+                <a:shade val="15000"/>
+              </a:schemeClr>
+            </a:lnRef>
+            <a:fillRef idx="1">
+              <a:schemeClr val="accent1"/>
+            </a:fillRef>
+            <a:effectRef idx="0">
+              <a:schemeClr val="accent1"/>
+            </a:effectRef>
+            <a:fontRef idx="minor">
+              <a:schemeClr val="lt1"/>
+            </a:fontRef>
+          </p:style>
+          <p:txBody>
+            <a:bodyPr rtlCol="0" anchor="ctr"/>
+            <a:lstStyle/>
+            <a:p>
+              <a:pPr algn="ctr"/>
+              <a:endParaRPr lang="da-DK"/>
+            </a:p>
+          </p:txBody>
+        </p:sp>
+        <p:cxnSp>
+          <p:nvCxnSpPr>
+            <p:cNvPr id="19" name="Lige forbindelse 18">
+              <a:extLst>
+                <a:ext uri="{FF2B5EF4-FFF2-40B4-BE49-F238E27FC236}">
+                  <a16:creationId xmlns:a16="http://schemas.microsoft.com/office/drawing/2014/main" id="{017433F8-E5A7-8BF1-56F0-76B054F2ADA9}"/>
+                </a:ext>
+              </a:extLst>
+            </p:cNvPr>
+            <p:cNvCxnSpPr/>
+            <p:nvPr/>
+          </p:nvCxnSpPr>
+          <p:spPr>
+            <a:xfrm>
+              <a:off x="2768163" y="2173802"/>
+              <a:ext cx="270000" cy="0"/>
+            </a:xfrm>
+            <a:prstGeom prst="line">
+              <a:avLst/>
+            </a:prstGeom>
+            <a:ln w="12700">
+              <a:solidFill>
+                <a:schemeClr val="tx1"/>
+              </a:solidFill>
+            </a:ln>
+          </p:spPr>
+          <p:style>
+            <a:lnRef idx="2">
+              <a:schemeClr val="accent1"/>
+            </a:lnRef>
+            <a:fillRef idx="0">
+              <a:schemeClr val="accent1"/>
+            </a:fillRef>
+            <a:effectRef idx="1">
+              <a:schemeClr val="accent1"/>
+            </a:effectRef>
+            <a:fontRef idx="minor">
+              <a:schemeClr val="tx1"/>
+            </a:fontRef>
+          </p:style>
+        </p:cxnSp>
+        <p:cxnSp>
+          <p:nvCxnSpPr>
+            <p:cNvPr id="20" name="Lige forbindelse 19">
+              <a:extLst>
+                <a:ext uri="{FF2B5EF4-FFF2-40B4-BE49-F238E27FC236}">
+                  <a16:creationId xmlns:a16="http://schemas.microsoft.com/office/drawing/2014/main" id="{A5511ABA-6DE5-3D62-B4D6-2AA623511644}"/>
+                </a:ext>
+              </a:extLst>
+            </p:cNvPr>
+            <p:cNvCxnSpPr>
+              <a:cxnSpLocks/>
+            </p:cNvCxnSpPr>
+            <p:nvPr/>
+          </p:nvCxnSpPr>
+          <p:spPr>
+            <a:xfrm>
+              <a:off x="2904115" y="2181176"/>
+              <a:ext cx="0" cy="194617"/>
+            </a:xfrm>
+            <a:prstGeom prst="line">
+              <a:avLst/>
+            </a:prstGeom>
+            <a:ln w="12700">
+              <a:solidFill>
+                <a:schemeClr val="tx1"/>
+              </a:solidFill>
+            </a:ln>
+          </p:spPr>
+          <p:style>
+            <a:lnRef idx="2">
+              <a:schemeClr val="accent1"/>
+            </a:lnRef>
+            <a:fillRef idx="0">
+              <a:schemeClr val="accent1"/>
+            </a:fillRef>
+            <a:effectRef idx="1">
+              <a:schemeClr val="accent1"/>
+            </a:effectRef>
+            <a:fontRef idx="minor">
+              <a:schemeClr val="tx1"/>
+            </a:fontRef>
+          </p:style>
+        </p:cxnSp>
+        <p:cxnSp>
+          <p:nvCxnSpPr>
+            <p:cNvPr id="22" name="Lige forbindelse 21">
+              <a:extLst>
+                <a:ext uri="{FF2B5EF4-FFF2-40B4-BE49-F238E27FC236}">
+                  <a16:creationId xmlns:a16="http://schemas.microsoft.com/office/drawing/2014/main" id="{F7262922-A928-D260-98A0-235BD6BD605D}"/>
+                </a:ext>
+              </a:extLst>
+            </p:cNvPr>
+            <p:cNvCxnSpPr>
+              <a:cxnSpLocks/>
+            </p:cNvCxnSpPr>
+            <p:nvPr/>
+          </p:nvCxnSpPr>
+          <p:spPr>
+            <a:xfrm>
+              <a:off x="2909030" y="1692021"/>
+              <a:ext cx="0" cy="194617"/>
+            </a:xfrm>
+            <a:prstGeom prst="line">
+              <a:avLst/>
+            </a:prstGeom>
+            <a:ln w="12700">
+              <a:solidFill>
+                <a:schemeClr val="tx1"/>
+              </a:solidFill>
+            </a:ln>
+          </p:spPr>
+          <p:style>
+            <a:lnRef idx="2">
+              <a:schemeClr val="accent1"/>
+            </a:lnRef>
+            <a:fillRef idx="0">
+              <a:schemeClr val="accent1"/>
+            </a:fillRef>
+            <a:effectRef idx="1">
+              <a:schemeClr val="accent1"/>
+            </a:effectRef>
+            <a:fontRef idx="minor">
+              <a:schemeClr val="tx1"/>
+            </a:fontRef>
+          </p:style>
+        </p:cxnSp>
+      </p:grpSp>
+      <p:cxnSp>
+        <p:nvCxnSpPr>
+          <p:cNvPr id="28" name="Lige forbindelse 27">
+            <a:extLst>
+              <a:ext uri="{FF2B5EF4-FFF2-40B4-BE49-F238E27FC236}">
+                <a16:creationId xmlns:a16="http://schemas.microsoft.com/office/drawing/2014/main" id="{93C142BE-D635-1C63-88B2-D89995707754}"/>
+              </a:ext>
+            </a:extLst>
+          </p:cNvPr>
+          <p:cNvCxnSpPr>
+            <a:cxnSpLocks/>
+          </p:cNvCxnSpPr>
+          <p:nvPr/>
+        </p:nvCxnSpPr>
+        <p:spPr>
+          <a:xfrm>
+            <a:off x="2379215" y="1695635"/>
+            <a:ext cx="0" cy="326344"/>
+          </a:xfrm>
+          <a:prstGeom prst="line">
+            <a:avLst/>
+          </a:prstGeom>
+          <a:ln w="12700"/>
+        </p:spPr>
+        <p:style>
+          <a:lnRef idx="2">
+            <a:schemeClr val="dk1"/>
+          </a:lnRef>
+          <a:fillRef idx="0">
+            <a:schemeClr val="dk1"/>
+          </a:fillRef>
+          <a:effectRef idx="1">
+            <a:schemeClr val="dk1"/>
+          </a:effectRef>
+          <a:fontRef idx="minor">
+            <a:schemeClr val="tx1"/>
+          </a:fontRef>
+        </p:style>
+      </p:cxnSp>
+      <p:sp>
+        <p:nvSpPr>
+          <p:cNvPr id="31" name="Tekstfelt 30">
+            <a:extLst>
+              <a:ext uri="{FF2B5EF4-FFF2-40B4-BE49-F238E27FC236}">
+                <a16:creationId xmlns:a16="http://schemas.microsoft.com/office/drawing/2014/main" id="{3CB0BD9F-D42E-7162-2961-AA71ACF6B2F7}"/>
+              </a:ext>
+            </a:extLst>
+          </p:cNvPr>
+          <p:cNvSpPr txBox="1"/>
+          <p:nvPr/>
+        </p:nvSpPr>
+        <p:spPr>
+          <a:xfrm>
+            <a:off x="1660122" y="1858807"/>
+            <a:ext cx="567810" cy="1015663"/>
+          </a:xfrm>
+          <a:prstGeom prst="rect">
+            <a:avLst/>
+          </a:prstGeom>
+          <a:noFill/>
+        </p:spPr>
+        <p:txBody>
+          <a:bodyPr wrap="square" rtlCol="0">
+            <a:spAutoFit/>
+          </a:bodyPr>
+          <a:lstStyle/>
+          <a:p>
+            <a:pPr algn="r"/>
+            <a:r>
+              <a:rPr lang="da-DK" sz="1200" dirty="0"/>
+              <a:t>+</a:t>
+            </a:r>
+            <a:br>
+              <a:rPr lang="da-DK" sz="1200" dirty="0"/>
+            </a:br>
+            <a:br>
+              <a:rPr lang="da-DK" sz="1200" dirty="0"/>
+            </a:br>
+            <a:r>
+              <a:rPr lang="da-DK" sz="1200" dirty="0"/>
+              <a:t>V_BE</a:t>
+            </a:r>
+            <a:br>
+              <a:rPr lang="da-DK" sz="1200" dirty="0"/>
+            </a:br>
+            <a:br>
+              <a:rPr lang="da-DK" sz="1200" dirty="0"/>
+            </a:br>
+            <a:r>
+              <a:rPr lang="da-DK" sz="1200" dirty="0"/>
+              <a:t>-</a:t>
+            </a:r>
+          </a:p>
+        </p:txBody>
+      </p:sp>
+      <p:grpSp>
+        <p:nvGrpSpPr>
+          <p:cNvPr id="35" name="Gruppe 34">
+            <a:extLst>
+              <a:ext uri="{FF2B5EF4-FFF2-40B4-BE49-F238E27FC236}">
+                <a16:creationId xmlns:a16="http://schemas.microsoft.com/office/drawing/2014/main" id="{C93E5179-7106-D395-F960-455C3C2DBDEB}"/>
+              </a:ext>
+            </a:extLst>
+          </p:cNvPr>
+          <p:cNvGrpSpPr/>
+          <p:nvPr/>
+        </p:nvGrpSpPr>
+        <p:grpSpPr>
+          <a:xfrm rot="5400000">
+            <a:off x="4846876" y="2047630"/>
+            <a:ext cx="1057338" cy="1206183"/>
+            <a:chOff x="1321878" y="578229"/>
+            <a:chExt cx="1057338" cy="1206183"/>
+          </a:xfrm>
+        </p:grpSpPr>
+        <p:grpSp>
+          <p:nvGrpSpPr>
+            <p:cNvPr id="36" name="Gruppe 35">
+              <a:extLst>
+                <a:ext uri="{FF2B5EF4-FFF2-40B4-BE49-F238E27FC236}">
+                  <a16:creationId xmlns:a16="http://schemas.microsoft.com/office/drawing/2014/main" id="{13564E55-23E5-6E7B-0580-9CCBC6F317C0}"/>
+                </a:ext>
+              </a:extLst>
+            </p:cNvPr>
+            <p:cNvGrpSpPr/>
+            <p:nvPr/>
+          </p:nvGrpSpPr>
+          <p:grpSpPr>
+            <a:xfrm>
+              <a:off x="1321878" y="1606858"/>
+              <a:ext cx="1057338" cy="177554"/>
+              <a:chOff x="1321878" y="1606858"/>
+              <a:chExt cx="1057338" cy="177554"/>
+            </a:xfrm>
+          </p:grpSpPr>
+          <p:sp>
+            <p:nvSpPr>
+              <p:cNvPr id="38" name="Rektangel 37">
+                <a:extLst>
+                  <a:ext uri="{FF2B5EF4-FFF2-40B4-BE49-F238E27FC236}">
+                    <a16:creationId xmlns:a16="http://schemas.microsoft.com/office/drawing/2014/main" id="{0C6FEC14-6C6E-4FF6-D0AF-98AC58F9E9CF}"/>
+                  </a:ext>
+                </a:extLst>
+              </p:cNvPr>
+              <p:cNvSpPr/>
+              <p:nvPr/>
+            </p:nvSpPr>
+            <p:spPr>
+              <a:xfrm>
+                <a:off x="1518082" y="1606858"/>
+                <a:ext cx="665825" cy="177554"/>
+              </a:xfrm>
+              <a:prstGeom prst="rect">
+                <a:avLst/>
+              </a:prstGeom>
+              <a:noFill/>
+              <a:ln w="12700">
+                <a:solidFill>
+                  <a:schemeClr val="tx1"/>
+                </a:solidFill>
+              </a:ln>
+            </p:spPr>
+            <p:style>
+              <a:lnRef idx="2">
+                <a:schemeClr val="accent1">
+                  <a:shade val="15000"/>
+                </a:schemeClr>
+              </a:lnRef>
+              <a:fillRef idx="1">
+                <a:schemeClr val="accent1"/>
+              </a:fillRef>
+              <a:effectRef idx="0">
+                <a:schemeClr val="accent1"/>
+              </a:effectRef>
+              <a:fontRef idx="minor">
+                <a:schemeClr val="lt1"/>
+              </a:fontRef>
+            </p:style>
+            <p:txBody>
+              <a:bodyPr rtlCol="0" anchor="ctr"/>
+              <a:lstStyle/>
+              <a:p>
+                <a:pPr algn="ctr"/>
+                <a:endParaRPr lang="da-DK"/>
+              </a:p>
+            </p:txBody>
+          </p:sp>
+          <p:cxnSp>
+            <p:nvCxnSpPr>
+              <p:cNvPr id="39" name="Lige forbindelse 38">
+                <a:extLst>
+                  <a:ext uri="{FF2B5EF4-FFF2-40B4-BE49-F238E27FC236}">
+                    <a16:creationId xmlns:a16="http://schemas.microsoft.com/office/drawing/2014/main" id="{5E525BC0-B86B-2CC8-A2C4-A4A1D878D2CC}"/>
+                  </a:ext>
+                </a:extLst>
+              </p:cNvPr>
+              <p:cNvCxnSpPr>
+                <a:cxnSpLocks/>
+                <a:stCxn id="38" idx="3"/>
+              </p:cNvCxnSpPr>
+              <p:nvPr/>
+            </p:nvCxnSpPr>
+            <p:spPr>
+              <a:xfrm>
+                <a:off x="2183907" y="1695635"/>
+                <a:ext cx="195309" cy="0"/>
+              </a:xfrm>
+              <a:prstGeom prst="line">
+                <a:avLst/>
+              </a:prstGeom>
+              <a:ln w="12700">
+                <a:solidFill>
+                  <a:schemeClr val="tx1"/>
+                </a:solidFill>
+              </a:ln>
+            </p:spPr>
+            <p:style>
+              <a:lnRef idx="2">
+                <a:schemeClr val="accent1"/>
+              </a:lnRef>
+              <a:fillRef idx="0">
+                <a:schemeClr val="accent1"/>
+              </a:fillRef>
+              <a:effectRef idx="1">
+                <a:schemeClr val="accent1"/>
+              </a:effectRef>
+              <a:fontRef idx="minor">
+                <a:schemeClr val="tx1"/>
+              </a:fontRef>
+            </p:style>
+          </p:cxnSp>
+          <p:cxnSp>
+            <p:nvCxnSpPr>
+              <p:cNvPr id="40" name="Lige forbindelse 39">
+                <a:extLst>
+                  <a:ext uri="{FF2B5EF4-FFF2-40B4-BE49-F238E27FC236}">
+                    <a16:creationId xmlns:a16="http://schemas.microsoft.com/office/drawing/2014/main" id="{36780A55-E325-5E72-6D1E-AA4C11BB3D55}"/>
+                  </a:ext>
+                </a:extLst>
+              </p:cNvPr>
+              <p:cNvCxnSpPr>
+                <a:cxnSpLocks/>
+              </p:cNvCxnSpPr>
+              <p:nvPr/>
+            </p:nvCxnSpPr>
+            <p:spPr>
+              <a:xfrm>
+                <a:off x="1321878" y="1702728"/>
+                <a:ext cx="195309" cy="0"/>
+              </a:xfrm>
+              <a:prstGeom prst="line">
+                <a:avLst/>
+              </a:prstGeom>
+              <a:ln w="12700">
+                <a:solidFill>
+                  <a:schemeClr val="tx1"/>
+                </a:solidFill>
+              </a:ln>
+            </p:spPr>
+            <p:style>
+              <a:lnRef idx="2">
+                <a:schemeClr val="accent1"/>
+              </a:lnRef>
+              <a:fillRef idx="0">
+                <a:schemeClr val="accent1"/>
+              </a:fillRef>
+              <a:effectRef idx="1">
+                <a:schemeClr val="accent1"/>
+              </a:effectRef>
+              <a:fontRef idx="minor">
+                <a:schemeClr val="tx1"/>
+              </a:fontRef>
+            </p:style>
+          </p:cxnSp>
+        </p:grpSp>
+        <p:sp>
+          <p:nvSpPr>
+            <p:cNvPr id="37" name="Tekstfelt 36">
+              <a:extLst>
+                <a:ext uri="{FF2B5EF4-FFF2-40B4-BE49-F238E27FC236}">
+                  <a16:creationId xmlns:a16="http://schemas.microsoft.com/office/drawing/2014/main" id="{820334C2-C783-88EB-D280-11CC1B8B52B0}"/>
+                </a:ext>
+              </a:extLst>
+            </p:cNvPr>
+            <p:cNvSpPr txBox="1"/>
+            <p:nvPr/>
+          </p:nvSpPr>
+          <p:spPr>
+            <a:xfrm rot="16200000">
+              <a:off x="1395999" y="950356"/>
+              <a:ext cx="1021254" cy="276999"/>
+            </a:xfrm>
+            <a:prstGeom prst="rect">
+              <a:avLst/>
+            </a:prstGeom>
+            <a:noFill/>
+          </p:spPr>
+          <p:txBody>
+            <a:bodyPr wrap="square" rtlCol="0">
+              <a:spAutoFit/>
+            </a:bodyPr>
+            <a:lstStyle/>
+            <a:p>
+              <a:r>
+                <a:rPr lang="da-DK" sz="1200" dirty="0"/>
+                <a:t>R0 = 100</a:t>
+              </a:r>
+              <a:r>
+                <a:rPr lang="el-GR" sz="1200" dirty="0"/>
+                <a:t>Ω</a:t>
+              </a:r>
+              <a:endParaRPr lang="da-DK" sz="1200" dirty="0"/>
+            </a:p>
+          </p:txBody>
+        </p:sp>
+      </p:grpSp>
+      <p:grpSp>
+        <p:nvGrpSpPr>
+          <p:cNvPr id="47" name="Gruppe 46">
+            <a:extLst>
+              <a:ext uri="{FF2B5EF4-FFF2-40B4-BE49-F238E27FC236}">
+                <a16:creationId xmlns:a16="http://schemas.microsoft.com/office/drawing/2014/main" id="{042343B2-DF83-58C6-C170-D4CEE870099F}"/>
+              </a:ext>
+            </a:extLst>
+          </p:cNvPr>
+          <p:cNvGrpSpPr/>
+          <p:nvPr/>
+        </p:nvGrpSpPr>
+        <p:grpSpPr>
+          <a:xfrm>
+            <a:off x="3005652" y="1712177"/>
+            <a:ext cx="360000" cy="993573"/>
+            <a:chOff x="3996808" y="1407409"/>
+            <a:chExt cx="360000" cy="993573"/>
+          </a:xfrm>
+        </p:grpSpPr>
+        <p:sp>
+          <p:nvSpPr>
+            <p:cNvPr id="41" name="Rektangel 40">
+              <a:extLst>
+                <a:ext uri="{FF2B5EF4-FFF2-40B4-BE49-F238E27FC236}">
+                  <a16:creationId xmlns:a16="http://schemas.microsoft.com/office/drawing/2014/main" id="{1CC283E8-7A5B-931D-8B17-EACC2DF34EE9}"/>
+                </a:ext>
+              </a:extLst>
+            </p:cNvPr>
+            <p:cNvSpPr/>
+            <p:nvPr/>
+          </p:nvSpPr>
+          <p:spPr>
+            <a:xfrm rot="2700000">
+              <a:off x="3996808" y="1771114"/>
+              <a:ext cx="360000" cy="360000"/>
+            </a:xfrm>
+            <a:prstGeom prst="rect">
+              <a:avLst/>
+            </a:prstGeom>
+            <a:noFill/>
+            <a:ln w="12700">
+              <a:solidFill>
+                <a:schemeClr val="tx1"/>
+              </a:solidFill>
+            </a:ln>
+          </p:spPr>
+          <p:style>
+            <a:lnRef idx="2">
+              <a:schemeClr val="accent1">
+                <a:shade val="15000"/>
+              </a:schemeClr>
+            </a:lnRef>
+            <a:fillRef idx="1">
+              <a:schemeClr val="accent1"/>
+            </a:fillRef>
+            <a:effectRef idx="0">
+              <a:schemeClr val="accent1"/>
+            </a:effectRef>
+            <a:fontRef idx="minor">
+              <a:schemeClr val="lt1"/>
+            </a:fontRef>
+          </p:style>
+          <p:txBody>
+            <a:bodyPr rtlCol="0" anchor="ctr"/>
+            <a:lstStyle/>
+            <a:p>
+              <a:pPr algn="ctr"/>
+              <a:endParaRPr lang="da-DK"/>
+            </a:p>
+          </p:txBody>
+        </p:sp>
+        <p:cxnSp>
+          <p:nvCxnSpPr>
+            <p:cNvPr id="44" name="Lige pilforbindelse 43">
+              <a:extLst>
+                <a:ext uri="{FF2B5EF4-FFF2-40B4-BE49-F238E27FC236}">
+                  <a16:creationId xmlns:a16="http://schemas.microsoft.com/office/drawing/2014/main" id="{6DD71386-AABA-EC9B-029B-AB759E3CCE83}"/>
+                </a:ext>
+              </a:extLst>
+            </p:cNvPr>
+            <p:cNvCxnSpPr/>
+            <p:nvPr/>
+          </p:nvCxnSpPr>
+          <p:spPr>
+            <a:xfrm>
+              <a:off x="4176808" y="1784412"/>
+              <a:ext cx="0" cy="326344"/>
+            </a:xfrm>
+            <a:prstGeom prst="straightConnector1">
+              <a:avLst/>
+            </a:prstGeom>
+            <a:ln w="12700">
+              <a:solidFill>
+                <a:schemeClr val="tx1"/>
+              </a:solidFill>
+              <a:tailEnd type="triangle"/>
+            </a:ln>
+          </p:spPr>
+          <p:style>
+            <a:lnRef idx="2">
+              <a:schemeClr val="accent1"/>
+            </a:lnRef>
+            <a:fillRef idx="0">
+              <a:schemeClr val="accent1"/>
+            </a:fillRef>
+            <a:effectRef idx="1">
+              <a:schemeClr val="accent1"/>
+            </a:effectRef>
+            <a:fontRef idx="minor">
+              <a:schemeClr val="tx1"/>
+            </a:fontRef>
+          </p:style>
+        </p:cxnSp>
+        <p:cxnSp>
+          <p:nvCxnSpPr>
+            <p:cNvPr id="45" name="Lige forbindelse 44">
+              <a:extLst>
+                <a:ext uri="{FF2B5EF4-FFF2-40B4-BE49-F238E27FC236}">
+                  <a16:creationId xmlns:a16="http://schemas.microsoft.com/office/drawing/2014/main" id="{802773A7-42E9-62CD-39CF-C92D62E6C19C}"/>
+                </a:ext>
+              </a:extLst>
+            </p:cNvPr>
+            <p:cNvCxnSpPr>
+              <a:cxnSpLocks/>
+            </p:cNvCxnSpPr>
+            <p:nvPr/>
+          </p:nvCxnSpPr>
+          <p:spPr>
+            <a:xfrm>
+              <a:off x="4176808" y="1407409"/>
+              <a:ext cx="0" cy="291883"/>
+            </a:xfrm>
+            <a:prstGeom prst="line">
+              <a:avLst/>
+            </a:prstGeom>
+            <a:ln w="12700">
+              <a:solidFill>
+                <a:schemeClr val="tx1"/>
+              </a:solidFill>
+            </a:ln>
+          </p:spPr>
+          <p:style>
+            <a:lnRef idx="2">
+              <a:schemeClr val="accent1"/>
+            </a:lnRef>
+            <a:fillRef idx="0">
+              <a:schemeClr val="accent1"/>
+            </a:fillRef>
+            <a:effectRef idx="1">
+              <a:schemeClr val="accent1"/>
+            </a:effectRef>
+            <a:fontRef idx="minor">
+              <a:schemeClr val="tx1"/>
+            </a:fontRef>
+          </p:style>
+        </p:cxnSp>
+        <p:cxnSp>
+          <p:nvCxnSpPr>
+            <p:cNvPr id="46" name="Lige forbindelse 45">
+              <a:extLst>
+                <a:ext uri="{FF2B5EF4-FFF2-40B4-BE49-F238E27FC236}">
+                  <a16:creationId xmlns:a16="http://schemas.microsoft.com/office/drawing/2014/main" id="{FFCF697B-5D2B-9BA6-8DF5-E93C0FABFB3F}"/>
+                </a:ext>
+              </a:extLst>
+            </p:cNvPr>
+            <p:cNvCxnSpPr>
+              <a:cxnSpLocks/>
+            </p:cNvCxnSpPr>
+            <p:nvPr/>
+          </p:nvCxnSpPr>
+          <p:spPr>
+            <a:xfrm rot="5400000">
+              <a:off x="4079152" y="2303328"/>
+              <a:ext cx="195309" cy="0"/>
+            </a:xfrm>
+            <a:prstGeom prst="line">
+              <a:avLst/>
+            </a:prstGeom>
+            <a:ln w="12700">
+              <a:solidFill>
+                <a:schemeClr val="tx1"/>
+              </a:solidFill>
+            </a:ln>
+          </p:spPr>
+          <p:style>
+            <a:lnRef idx="2">
+              <a:schemeClr val="accent1"/>
+            </a:lnRef>
+            <a:fillRef idx="0">
+              <a:schemeClr val="accent1"/>
+            </a:fillRef>
+            <a:effectRef idx="1">
+              <a:schemeClr val="accent1"/>
+            </a:effectRef>
+            <a:fontRef idx="minor">
+              <a:schemeClr val="tx1"/>
+            </a:fontRef>
+          </p:style>
+        </p:cxnSp>
+      </p:grpSp>
+      <p:cxnSp>
+        <p:nvCxnSpPr>
+          <p:cNvPr id="72" name="Lige forbindelse 71">
+            <a:extLst>
+              <a:ext uri="{FF2B5EF4-FFF2-40B4-BE49-F238E27FC236}">
+                <a16:creationId xmlns:a16="http://schemas.microsoft.com/office/drawing/2014/main" id="{984AC616-36A5-6C77-70F6-8D5008E433B1}"/>
+              </a:ext>
+            </a:extLst>
+          </p:cNvPr>
+          <p:cNvCxnSpPr/>
+          <p:nvPr/>
+        </p:nvCxnSpPr>
+        <p:spPr>
+          <a:xfrm>
+            <a:off x="1321876" y="2684776"/>
+            <a:ext cx="0" cy="1076633"/>
+          </a:xfrm>
+          <a:prstGeom prst="line">
+            <a:avLst/>
+          </a:prstGeom>
+          <a:ln w="12700">
+            <a:solidFill>
+              <a:schemeClr val="tx1"/>
+            </a:solidFill>
+          </a:ln>
+        </p:spPr>
+        <p:style>
+          <a:lnRef idx="2">
+            <a:schemeClr val="accent1"/>
+          </a:lnRef>
+          <a:fillRef idx="0">
+            <a:schemeClr val="accent1"/>
+          </a:fillRef>
+          <a:effectRef idx="1">
+            <a:schemeClr val="accent1"/>
+          </a:effectRef>
+          <a:fontRef idx="minor">
+            <a:schemeClr val="tx1"/>
+          </a:fontRef>
+        </p:style>
+      </p:cxnSp>
+      <p:sp>
+        <p:nvSpPr>
+          <p:cNvPr id="78" name="Tekstfelt 77">
+            <a:extLst>
+              <a:ext uri="{FF2B5EF4-FFF2-40B4-BE49-F238E27FC236}">
+                <a16:creationId xmlns:a16="http://schemas.microsoft.com/office/drawing/2014/main" id="{1F5A0F14-B21D-9640-E65F-7C800ED1AAA9}"/>
+              </a:ext>
+            </a:extLst>
+          </p:cNvPr>
+          <p:cNvSpPr txBox="1"/>
+          <p:nvPr/>
+        </p:nvSpPr>
+        <p:spPr>
+          <a:xfrm>
+            <a:off x="1321876" y="671210"/>
+            <a:ext cx="3168411" cy="369332"/>
+          </a:xfrm>
+          <a:prstGeom prst="rect">
+            <a:avLst/>
+          </a:prstGeom>
+          <a:noFill/>
+        </p:spPr>
+        <p:txBody>
+          <a:bodyPr wrap="square" rtlCol="0">
+            <a:spAutoFit/>
+          </a:bodyPr>
+          <a:lstStyle/>
+          <a:p>
+            <a:r>
+              <a:rPr lang="da-DK" dirty="0"/>
+              <a:t>Blocks</a:t>
+            </a:r>
+          </a:p>
+        </p:txBody>
+      </p:sp>
+      <p:sp>
+        <p:nvSpPr>
+          <p:cNvPr id="2" name="Tekstfelt 1">
+            <a:extLst>
+              <a:ext uri="{FF2B5EF4-FFF2-40B4-BE49-F238E27FC236}">
+                <a16:creationId xmlns:a16="http://schemas.microsoft.com/office/drawing/2014/main" id="{4503062A-0E02-3114-355C-19CE65AADBDF}"/>
+              </a:ext>
+            </a:extLst>
+          </p:cNvPr>
+          <p:cNvSpPr txBox="1"/>
+          <p:nvPr/>
+        </p:nvSpPr>
+        <p:spPr>
+          <a:xfrm>
+            <a:off x="3398329" y="2106618"/>
+            <a:ext cx="802403" cy="276999"/>
+          </a:xfrm>
+          <a:prstGeom prst="rect">
+            <a:avLst/>
+          </a:prstGeom>
+          <a:noFill/>
+        </p:spPr>
+        <p:txBody>
+          <a:bodyPr wrap="square" rtlCol="0">
+            <a:spAutoFit/>
+          </a:bodyPr>
+          <a:lstStyle/>
+          <a:p>
+            <a:r>
+              <a:rPr lang="da-DK" sz="1200" dirty="0"/>
+              <a:t>gm*</a:t>
+            </a:r>
+            <a:r>
+              <a:rPr lang="da-DK" sz="1200" dirty="0" err="1"/>
+              <a:t>Vbe</a:t>
+            </a:r>
+            <a:endParaRPr lang="da-DK" sz="1200" dirty="0"/>
+          </a:p>
+        </p:txBody>
+      </p:sp>
+    </p:spTree>
+    <p:extLst>
+      <p:ext uri="{BB962C8B-B14F-4D97-AF65-F5344CB8AC3E}">
+        <p14:creationId xmlns:p14="http://schemas.microsoft.com/office/powerpoint/2010/main" val="4131852391"/>
+      </p:ext>
+    </p:extLst>
+  </p:cSld>
+  <p:clrMapOvr>
+    <a:masterClrMapping/>
+  </p:clrMapOvr>
+</p:sld>
+</file>
+
+<file path=ppt/slides/slide2.xml><?xml version="1.0" encoding="utf-8"?>
+<p:sld xmlns:a="http://schemas.openxmlformats.org/drawingml/2006/main" xmlns:r="http://schemas.openxmlformats.org/officeDocument/2006/relationships" xmlns:p="http://schemas.openxmlformats.org/presentationml/2006/main">
+  <p:cSld>
+    <p:spTree>
+      <p:nvGrpSpPr>
+        <p:cNvPr id="1" name=""/>
+        <p:cNvGrpSpPr/>
+        <p:nvPr/>
+      </p:nvGrpSpPr>
+      <p:grpSpPr>
+        <a:xfrm>
+          <a:off x="0" y="0"/>
+          <a:ext cx="0" cy="0"/>
+          <a:chOff x="0" y="0"/>
+          <a:chExt cx="0" cy="0"/>
+        </a:xfrm>
+      </p:grpSpPr>
+      <p:grpSp>
+        <p:nvGrpSpPr>
+          <p:cNvPr id="26" name="Gruppe 25">
+            <a:extLst>
+              <a:ext uri="{FF2B5EF4-FFF2-40B4-BE49-F238E27FC236}">
+                <a16:creationId xmlns:a16="http://schemas.microsoft.com/office/drawing/2014/main" id="{0E634C5D-0644-B862-E060-7D46390C254A}"/>
+              </a:ext>
+            </a:extLst>
+          </p:cNvPr>
+          <p:cNvGrpSpPr/>
+          <p:nvPr/>
+        </p:nvGrpSpPr>
+        <p:grpSpPr>
+          <a:xfrm>
             <a:off x="1321878" y="1305575"/>
             <a:ext cx="1118908" cy="478837"/>
             <a:chOff x="1321878" y="1305575"/>
@@ -5231,7 +6538,7 @@
 </p:sld>
 </file>
 
-<file path=ppt/slides/slide2.xml><?xml version="1.0" encoding="utf-8"?>
+<file path=ppt/slides/slide3.xml><?xml version="1.0" encoding="utf-8"?>
 <p:sld xmlns:a="http://schemas.openxmlformats.org/drawingml/2006/main" xmlns:r="http://schemas.openxmlformats.org/officeDocument/2006/relationships" xmlns:p="http://schemas.openxmlformats.org/presentationml/2006/main">
   <p:cSld>
     <p:spTree>
@@ -7601,7 +8908,7 @@
 </p:sld>
 </file>
 
-<file path=ppt/slides/slide3.xml><?xml version="1.0" encoding="utf-8"?>
+<file path=ppt/slides/slide4.xml><?xml version="1.0" encoding="utf-8"?>
 <p:sld xmlns:a="http://schemas.openxmlformats.org/drawingml/2006/main" xmlns:r="http://schemas.openxmlformats.org/officeDocument/2006/relationships" xmlns:p="http://schemas.openxmlformats.org/presentationml/2006/main">
   <p:cSld>
     <p:spTree>
@@ -10460,7 +11767,7 @@
 </p:sld>
 </file>
 
-<file path=ppt/slides/slide4.xml><?xml version="1.0" encoding="utf-8"?>
+<file path=ppt/slides/slide5.xml><?xml version="1.0" encoding="utf-8"?>
 <p:sld xmlns:a="http://schemas.openxmlformats.org/drawingml/2006/main" xmlns:r="http://schemas.openxmlformats.org/officeDocument/2006/relationships" xmlns:p="http://schemas.openxmlformats.org/presentationml/2006/main">
   <p:cSld>
     <p:spTree>
@@ -13141,7 +14448,7 @@
 </p:sld>
 </file>
 
-<file path=ppt/slides/slide5.xml><?xml version="1.0" encoding="utf-8"?>
+<file path=ppt/slides/slide6.xml><?xml version="1.0" encoding="utf-8"?>
 <p:sld xmlns:a="http://schemas.openxmlformats.org/drawingml/2006/main" xmlns:r="http://schemas.openxmlformats.org/officeDocument/2006/relationships" xmlns:p="http://schemas.openxmlformats.org/presentationml/2006/main">
   <p:cSld>
     <p:spTree>
@@ -15495,7 +16802,7 @@
 </p:sld>
 </file>
 
-<file path=ppt/slides/slide6.xml><?xml version="1.0" encoding="utf-8"?>
+<file path=ppt/slides/slide7.xml><?xml version="1.0" encoding="utf-8"?>
 <p:sld xmlns:a="http://schemas.openxmlformats.org/drawingml/2006/main" xmlns:r="http://schemas.openxmlformats.org/officeDocument/2006/relationships" xmlns:p="http://schemas.openxmlformats.org/presentationml/2006/main">
   <p:cSld>
     <p:spTree>

</xml_diff>